<commit_message>
Added the design of the screens of the challenges and friends sections
</commit_message>
<xml_diff>
--- a/Screens/Screens.pptx
+++ b/Screens/Screens.pptx
@@ -6449,61 +6449,6 @@
           </a:p>
         </p:txBody>
       </p:sp>
-      <p:sp>
-        <p:nvSpPr>
-          <p:cNvPr id="132" name="Rectangle: Rounded Corners 131">
-            <a:extLst>
-              <a:ext uri="{FF2B5EF4-FFF2-40B4-BE49-F238E27FC236}">
-                <a16:creationId xmlns:a16="http://schemas.microsoft.com/office/drawing/2014/main" id="{780AE356-9DA9-4FB1-8746-1B15115D53E0}"/>
-              </a:ext>
-            </a:extLst>
-          </p:cNvPr>
-          <p:cNvSpPr/>
-          <p:nvPr/>
-        </p:nvSpPr>
-        <p:spPr>
-          <a:xfrm>
-            <a:off x="15481977" y="5773888"/>
-            <a:ext cx="3040262" cy="625935"/>
-          </a:xfrm>
-          <a:prstGeom prst="roundRect">
-            <a:avLst/>
-          </a:prstGeom>
-          <a:solidFill>
-            <a:srgbClr val="C00000"/>
-          </a:solidFill>
-          <a:ln>
-            <a:noFill/>
-          </a:ln>
-        </p:spPr>
-        <p:style>
-          <a:lnRef idx="2">
-            <a:schemeClr val="accent1">
-              <a:shade val="50000"/>
-            </a:schemeClr>
-          </a:lnRef>
-          <a:fillRef idx="1">
-            <a:schemeClr val="accent1"/>
-          </a:fillRef>
-          <a:effectRef idx="0">
-            <a:schemeClr val="accent1"/>
-          </a:effectRef>
-          <a:fontRef idx="minor">
-            <a:schemeClr val="lt1"/>
-          </a:fontRef>
-        </p:style>
-        <p:txBody>
-          <a:bodyPr rtlCol="0" anchor="ctr"/>
-          <a:lstStyle/>
-          <a:p>
-            <a:pPr algn="ctr"/>
-            <a:r>
-              <a:rPr lang="en-US" dirty="0"/>
-              <a:t>Resign</a:t>
-            </a:r>
-          </a:p>
-        </p:txBody>
-      </p:sp>
       <p:grpSp>
         <p:nvGrpSpPr>
           <p:cNvPr id="133" name="Group 132">
@@ -14861,6 +14806,53 @@
           <a:chExt cx="0" cy="0"/>
         </a:xfrm>
       </p:grpSpPr>
+      <p:sp>
+        <p:nvSpPr>
+          <p:cNvPr id="3" name="Rectangle 2">
+            <a:extLst>
+              <a:ext uri="{FF2B5EF4-FFF2-40B4-BE49-F238E27FC236}">
+                <a16:creationId xmlns:a16="http://schemas.microsoft.com/office/drawing/2014/main" id="{BA735484-2742-4747-A138-7B851E1B124C}"/>
+              </a:ext>
+            </a:extLst>
+          </p:cNvPr>
+          <p:cNvSpPr/>
+          <p:nvPr/>
+        </p:nvSpPr>
+        <p:spPr>
+          <a:xfrm>
+            <a:off x="-179639913" y="-177119756"/>
+            <a:ext cx="365760000" cy="365760000"/>
+          </a:xfrm>
+          <a:prstGeom prst="rect">
+            <a:avLst/>
+          </a:prstGeom>
+          <a:noFill/>
+        </p:spPr>
+        <p:style>
+          <a:lnRef idx="2">
+            <a:schemeClr val="accent1">
+              <a:shade val="50000"/>
+            </a:schemeClr>
+          </a:lnRef>
+          <a:fillRef idx="1">
+            <a:schemeClr val="accent1"/>
+          </a:fillRef>
+          <a:effectRef idx="0">
+            <a:schemeClr val="accent1"/>
+          </a:effectRef>
+          <a:fontRef idx="minor">
+            <a:schemeClr val="lt1"/>
+          </a:fontRef>
+        </p:style>
+        <p:txBody>
+          <a:bodyPr rtlCol="0" anchor="ctr"/>
+          <a:lstStyle/>
+          <a:p>
+            <a:pPr algn="ctr"/>
+            <a:endParaRPr lang="en-US"/>
+          </a:p>
+        </p:txBody>
+      </p:sp>
       <p:grpSp>
         <p:nvGrpSpPr>
           <p:cNvPr id="34" name="Group 33">
@@ -16010,7 +16002,7 @@
         </p:nvGrpSpPr>
         <p:grpSpPr>
           <a:xfrm>
-            <a:off x="119121" y="2497754"/>
+            <a:off x="119121" y="3303292"/>
             <a:ext cx="3058420" cy="978559"/>
             <a:chOff x="-3968617" y="7715552"/>
             <a:chExt cx="3058420" cy="978559"/>
@@ -16210,7 +16202,7 @@
         </p:nvGrpSpPr>
         <p:grpSpPr>
           <a:xfrm>
-            <a:off x="3323594" y="2497754"/>
+            <a:off x="3323594" y="3303292"/>
             <a:ext cx="3058420" cy="978559"/>
             <a:chOff x="-3968617" y="7715552"/>
             <a:chExt cx="3058420" cy="978559"/>
@@ -16346,7 +16338,7 @@
         </p:blipFill>
         <p:spPr>
           <a:xfrm>
-            <a:off x="3588509" y="2664760"/>
+            <a:off x="3588509" y="3470298"/>
             <a:ext cx="587250" cy="559518"/>
           </a:xfrm>
           <a:prstGeom prst="ellipse">
@@ -16858,6 +16850,734 @@
           </a:fontRef>
         </p:style>
       </p:cxnSp>
+      <p:sp>
+        <p:nvSpPr>
+          <p:cNvPr id="2" name="TextBox 1">
+            <a:extLst>
+              <a:ext uri="{FF2B5EF4-FFF2-40B4-BE49-F238E27FC236}">
+                <a16:creationId xmlns:a16="http://schemas.microsoft.com/office/drawing/2014/main" id="{CC958679-55F3-41B2-831B-354502AAAF45}"/>
+              </a:ext>
+            </a:extLst>
+          </p:cNvPr>
+          <p:cNvSpPr txBox="1"/>
+          <p:nvPr/>
+        </p:nvSpPr>
+        <p:spPr>
+          <a:xfrm>
+            <a:off x="119121" y="2417689"/>
+            <a:ext cx="3583032" cy="523220"/>
+          </a:xfrm>
+          <a:prstGeom prst="rect">
+            <a:avLst/>
+          </a:prstGeom>
+          <a:noFill/>
+        </p:spPr>
+        <p:txBody>
+          <a:bodyPr wrap="none" rtlCol="0">
+            <a:spAutoFit/>
+          </a:bodyPr>
+          <a:lstStyle/>
+          <a:p>
+            <a:r>
+              <a:rPr lang="en-US" sz="2800" dirty="0">
+                <a:solidFill>
+                  <a:schemeClr val="bg1"/>
+                </a:solidFill>
+                <a:latin typeface="Bahnschrift" panose="020B0502040204020203" pitchFamily="34" charset="0"/>
+              </a:rPr>
+              <a:t>Your friend code: 1234</a:t>
+            </a:r>
+          </a:p>
+        </p:txBody>
+      </p:sp>
+      <p:sp>
+        <p:nvSpPr>
+          <p:cNvPr id="56" name="Rectangle 55">
+            <a:extLst>
+              <a:ext uri="{FF2B5EF4-FFF2-40B4-BE49-F238E27FC236}">
+                <a16:creationId xmlns:a16="http://schemas.microsoft.com/office/drawing/2014/main" id="{8F12417E-0B84-4870-BFBE-5BB69FB85C63}"/>
+              </a:ext>
+            </a:extLst>
+          </p:cNvPr>
+          <p:cNvSpPr/>
+          <p:nvPr/>
+        </p:nvSpPr>
+        <p:spPr>
+          <a:xfrm>
+            <a:off x="-7874053" y="8018297"/>
+            <a:ext cx="6480175" cy="6755523"/>
+          </a:xfrm>
+          <a:prstGeom prst="rect">
+            <a:avLst/>
+          </a:prstGeom>
+          <a:blipFill>
+            <a:blip r:embed="rId3"/>
+            <a:stretch>
+              <a:fillRect/>
+            </a:stretch>
+          </a:blipFill>
+          <a:ln>
+            <a:noFill/>
+          </a:ln>
+        </p:spPr>
+        <p:style>
+          <a:lnRef idx="2">
+            <a:schemeClr val="accent1">
+              <a:shade val="50000"/>
+            </a:schemeClr>
+          </a:lnRef>
+          <a:fillRef idx="1">
+            <a:schemeClr val="accent1"/>
+          </a:fillRef>
+          <a:effectRef idx="0">
+            <a:schemeClr val="accent1"/>
+          </a:effectRef>
+          <a:fontRef idx="minor">
+            <a:schemeClr val="lt1"/>
+          </a:fontRef>
+        </p:style>
+        <p:txBody>
+          <a:bodyPr rtlCol="0" anchor="ctr"/>
+          <a:lstStyle/>
+          <a:p>
+            <a:pPr algn="ctr"/>
+            <a:endParaRPr lang="en-US" dirty="0"/>
+          </a:p>
+        </p:txBody>
+      </p:sp>
+      <p:cxnSp>
+        <p:nvCxnSpPr>
+          <p:cNvPr id="5" name="Straight Arrow Connector 4">
+            <a:extLst>
+              <a:ext uri="{FF2B5EF4-FFF2-40B4-BE49-F238E27FC236}">
+                <a16:creationId xmlns:a16="http://schemas.microsoft.com/office/drawing/2014/main" id="{4855DCD7-3048-4CEB-A13D-289B7840131D}"/>
+              </a:ext>
+            </a:extLst>
+          </p:cNvPr>
+          <p:cNvCxnSpPr>
+            <a:cxnSpLocks/>
+            <a:stCxn id="56" idx="3"/>
+          </p:cNvCxnSpPr>
+          <p:nvPr/>
+        </p:nvCxnSpPr>
+        <p:spPr>
+          <a:xfrm flipV="1">
+            <a:off x="-1393878" y="4563521"/>
+            <a:ext cx="2548300" cy="6832538"/>
+          </a:xfrm>
+          <a:prstGeom prst="straightConnector1">
+            <a:avLst/>
+          </a:prstGeom>
+          <a:ln>
+            <a:tailEnd type="triangle"/>
+          </a:ln>
+        </p:spPr>
+        <p:style>
+          <a:lnRef idx="3">
+            <a:schemeClr val="accent3"/>
+          </a:lnRef>
+          <a:fillRef idx="0">
+            <a:schemeClr val="accent3"/>
+          </a:fillRef>
+          <a:effectRef idx="2">
+            <a:schemeClr val="accent3"/>
+          </a:effectRef>
+          <a:fontRef idx="minor">
+            <a:schemeClr val="tx1"/>
+          </a:fontRef>
+        </p:style>
+      </p:cxnSp>
+      <p:grpSp>
+        <p:nvGrpSpPr>
+          <p:cNvPr id="57" name="Group 56">
+            <a:extLst>
+              <a:ext uri="{FF2B5EF4-FFF2-40B4-BE49-F238E27FC236}">
+                <a16:creationId xmlns:a16="http://schemas.microsoft.com/office/drawing/2014/main" id="{2069EAAB-1349-46A4-B030-F5203B242FD7}"/>
+              </a:ext>
+            </a:extLst>
+          </p:cNvPr>
+          <p:cNvGrpSpPr/>
+          <p:nvPr/>
+        </p:nvGrpSpPr>
+        <p:grpSpPr>
+          <a:xfrm>
+            <a:off x="-7613037" y="8733015"/>
+            <a:ext cx="5888554" cy="4593953"/>
+            <a:chOff x="-3968617" y="7715551"/>
+            <a:chExt cx="5888554" cy="4593953"/>
+          </a:xfrm>
+        </p:grpSpPr>
+        <p:sp>
+          <p:nvSpPr>
+            <p:cNvPr id="59" name="Rectangle: Rounded Corners 58">
+              <a:extLst>
+                <a:ext uri="{FF2B5EF4-FFF2-40B4-BE49-F238E27FC236}">
+                  <a16:creationId xmlns:a16="http://schemas.microsoft.com/office/drawing/2014/main" id="{CF6A7B3B-16A4-4BDC-B6E7-8AE505CF43A9}"/>
+                </a:ext>
+              </a:extLst>
+            </p:cNvPr>
+            <p:cNvSpPr/>
+            <p:nvPr/>
+          </p:nvSpPr>
+          <p:spPr>
+            <a:xfrm>
+              <a:off x="-3968617" y="7715551"/>
+              <a:ext cx="5888554" cy="4593953"/>
+            </a:xfrm>
+            <a:prstGeom prst="roundRect">
+              <a:avLst/>
+            </a:prstGeom>
+            <a:solidFill>
+              <a:schemeClr val="tx1">
+                <a:lumMod val="75000"/>
+                <a:lumOff val="25000"/>
+              </a:schemeClr>
+            </a:solidFill>
+            <a:ln>
+              <a:solidFill>
+                <a:srgbClr val="FF6700"/>
+              </a:solidFill>
+            </a:ln>
+          </p:spPr>
+          <p:style>
+            <a:lnRef idx="2">
+              <a:schemeClr val="accent1">
+                <a:shade val="50000"/>
+              </a:schemeClr>
+            </a:lnRef>
+            <a:fillRef idx="1">
+              <a:schemeClr val="accent1"/>
+            </a:fillRef>
+            <a:effectRef idx="0">
+              <a:schemeClr val="accent1"/>
+            </a:effectRef>
+            <a:fontRef idx="minor">
+              <a:schemeClr val="lt1"/>
+            </a:fontRef>
+          </p:style>
+          <p:txBody>
+            <a:bodyPr rtlCol="0" anchor="ctr"/>
+            <a:lstStyle/>
+            <a:p>
+              <a:pPr algn="ctr"/>
+              <a:endParaRPr lang="en-US" dirty="0"/>
+            </a:p>
+          </p:txBody>
+        </p:sp>
+        <p:grpSp>
+          <p:nvGrpSpPr>
+            <p:cNvPr id="60" name="Group 59">
+              <a:extLst>
+                <a:ext uri="{FF2B5EF4-FFF2-40B4-BE49-F238E27FC236}">
+                  <a16:creationId xmlns:a16="http://schemas.microsoft.com/office/drawing/2014/main" id="{45E82F00-8F86-43C8-9FB2-E7E7FE474D8D}"/>
+                </a:ext>
+              </a:extLst>
+            </p:cNvPr>
+            <p:cNvGrpSpPr/>
+            <p:nvPr/>
+          </p:nvGrpSpPr>
+          <p:grpSpPr>
+            <a:xfrm>
+              <a:off x="-3827400" y="7826822"/>
+              <a:ext cx="1960008" cy="739876"/>
+              <a:chOff x="810348" y="2460802"/>
+              <a:chExt cx="1960008" cy="739876"/>
+            </a:xfrm>
+          </p:grpSpPr>
+          <p:sp>
+            <p:nvSpPr>
+              <p:cNvPr id="61" name="TextBox 60">
+                <a:extLst>
+                  <a:ext uri="{FF2B5EF4-FFF2-40B4-BE49-F238E27FC236}">
+                    <a16:creationId xmlns:a16="http://schemas.microsoft.com/office/drawing/2014/main" id="{7E6E345D-5E80-44E2-A941-7F48B964747F}"/>
+                  </a:ext>
+                </a:extLst>
+              </p:cNvPr>
+              <p:cNvSpPr txBox="1"/>
+              <p:nvPr/>
+            </p:nvSpPr>
+            <p:spPr>
+              <a:xfrm>
+                <a:off x="1521296" y="2554347"/>
+                <a:ext cx="1249060" cy="646331"/>
+              </a:xfrm>
+              <a:prstGeom prst="rect">
+                <a:avLst/>
+              </a:prstGeom>
+              <a:noFill/>
+            </p:spPr>
+            <p:txBody>
+              <a:bodyPr wrap="none" rtlCol="0">
+                <a:spAutoFit/>
+              </a:bodyPr>
+              <a:lstStyle/>
+              <a:p>
+                <a:r>
+                  <a:rPr lang="es-ES" sz="3600" dirty="0">
+                    <a:solidFill>
+                      <a:schemeClr val="bg1"/>
+                    </a:solidFill>
+                  </a:rPr>
+                  <a:t>Julián</a:t>
+                </a:r>
+                <a:endParaRPr lang="es-MX" sz="3600" dirty="0">
+                  <a:solidFill>
+                    <a:schemeClr val="bg1"/>
+                  </a:solidFill>
+                </a:endParaRPr>
+              </a:p>
+            </p:txBody>
+          </p:sp>
+          <p:pic>
+            <p:nvPicPr>
+              <p:cNvPr id="62" name="Picture 61">
+                <a:extLst>
+                  <a:ext uri="{FF2B5EF4-FFF2-40B4-BE49-F238E27FC236}">
+                    <a16:creationId xmlns:a16="http://schemas.microsoft.com/office/drawing/2014/main" id="{6D096946-213C-4A53-8A41-56674695AC58}"/>
+                  </a:ext>
+                </a:extLst>
+              </p:cNvPr>
+              <p:cNvPicPr>
+                <a:picLocks noChangeAspect="1"/>
+              </p:cNvPicPr>
+              <p:nvPr/>
+            </p:nvPicPr>
+            <p:blipFill>
+              <a:blip r:embed="rId4">
+                <a:extLst>
+                  <a:ext uri="{28A0092B-C50C-407E-A947-70E740481C1C}">
+                    <a14:useLocalDpi xmlns:a14="http://schemas.microsoft.com/office/drawing/2010/main" val="0"/>
+                  </a:ext>
+                </a:extLst>
+              </a:blip>
+              <a:stretch>
+                <a:fillRect/>
+              </a:stretch>
+            </p:blipFill>
+            <p:spPr>
+              <a:xfrm>
+                <a:off x="810348" y="2460802"/>
+                <a:ext cx="587251" cy="669003"/>
+              </a:xfrm>
+              <a:prstGeom prst="ellipse">
+                <a:avLst/>
+              </a:prstGeom>
+              <a:ln w="63500" cap="rnd">
+                <a:noFill/>
+              </a:ln>
+              <a:effectLst>
+                <a:outerShdw blurRad="149987" dist="250190" dir="8460000" algn="ctr">
+                  <a:srgbClr val="000000">
+                    <a:alpha val="28000"/>
+                  </a:srgbClr>
+                </a:outerShdw>
+              </a:effectLst>
+              <a:scene3d>
+                <a:camera prst="orthographicFront">
+                  <a:rot lat="0" lon="0" rev="0"/>
+                </a:camera>
+                <a:lightRig rig="contrasting" dir="t">
+                  <a:rot lat="0" lon="0" rev="1500000"/>
+                </a:lightRig>
+              </a:scene3d>
+              <a:sp3d prstMaterial="metal">
+                <a:bevelT w="88900" h="88900"/>
+              </a:sp3d>
+            </p:spPr>
+          </p:pic>
+        </p:grpSp>
+      </p:grpSp>
+      <p:grpSp>
+        <p:nvGrpSpPr>
+          <p:cNvPr id="71" name="Group 70">
+            <a:extLst>
+              <a:ext uri="{FF2B5EF4-FFF2-40B4-BE49-F238E27FC236}">
+                <a16:creationId xmlns:a16="http://schemas.microsoft.com/office/drawing/2014/main" id="{0C3D3CD8-D991-4174-B929-3A9B40CD0837}"/>
+              </a:ext>
+            </a:extLst>
+          </p:cNvPr>
+          <p:cNvGrpSpPr/>
+          <p:nvPr/>
+        </p:nvGrpSpPr>
+        <p:grpSpPr>
+          <a:xfrm>
+            <a:off x="-7609193" y="13614868"/>
+            <a:ext cx="3058420" cy="978559"/>
+            <a:chOff x="-3968617" y="7715552"/>
+            <a:chExt cx="3058420" cy="978559"/>
+          </a:xfrm>
+        </p:grpSpPr>
+        <p:sp>
+          <p:nvSpPr>
+            <p:cNvPr id="72" name="Rectangle: Rounded Corners 71">
+              <a:extLst>
+                <a:ext uri="{FF2B5EF4-FFF2-40B4-BE49-F238E27FC236}">
+                  <a16:creationId xmlns:a16="http://schemas.microsoft.com/office/drawing/2014/main" id="{E33000BE-873C-43E8-9B85-6A4A4E5E823C}"/>
+                </a:ext>
+              </a:extLst>
+            </p:cNvPr>
+            <p:cNvSpPr/>
+            <p:nvPr/>
+          </p:nvSpPr>
+          <p:spPr>
+            <a:xfrm>
+              <a:off x="-3968617" y="7715552"/>
+              <a:ext cx="3058420" cy="978559"/>
+            </a:xfrm>
+            <a:prstGeom prst="roundRect">
+              <a:avLst/>
+            </a:prstGeom>
+            <a:solidFill>
+              <a:schemeClr val="tx1">
+                <a:lumMod val="75000"/>
+                <a:lumOff val="25000"/>
+              </a:schemeClr>
+            </a:solidFill>
+            <a:ln>
+              <a:solidFill>
+                <a:srgbClr val="FF6700"/>
+              </a:solidFill>
+            </a:ln>
+          </p:spPr>
+          <p:style>
+            <a:lnRef idx="2">
+              <a:schemeClr val="accent1">
+                <a:shade val="50000"/>
+              </a:schemeClr>
+            </a:lnRef>
+            <a:fillRef idx="1">
+              <a:schemeClr val="accent1"/>
+            </a:fillRef>
+            <a:effectRef idx="0">
+              <a:schemeClr val="accent1"/>
+            </a:effectRef>
+            <a:fontRef idx="minor">
+              <a:schemeClr val="lt1"/>
+            </a:fontRef>
+          </p:style>
+          <p:txBody>
+            <a:bodyPr rtlCol="0" anchor="ctr"/>
+            <a:lstStyle/>
+            <a:p>
+              <a:pPr algn="ctr"/>
+              <a:endParaRPr lang="en-US" dirty="0"/>
+            </a:p>
+          </p:txBody>
+        </p:sp>
+        <p:sp>
+          <p:nvSpPr>
+            <p:cNvPr id="73" name="TextBox 72">
+              <a:extLst>
+                <a:ext uri="{FF2B5EF4-FFF2-40B4-BE49-F238E27FC236}">
+                  <a16:creationId xmlns:a16="http://schemas.microsoft.com/office/drawing/2014/main" id="{47D1972D-3CFA-425B-95E2-BA66F468A5BD}"/>
+                </a:ext>
+              </a:extLst>
+            </p:cNvPr>
+            <p:cNvSpPr txBox="1"/>
+            <p:nvPr/>
+          </p:nvSpPr>
+          <p:spPr>
+            <a:xfrm>
+              <a:off x="-3116452" y="7920367"/>
+              <a:ext cx="1635448" cy="646331"/>
+            </a:xfrm>
+            <a:prstGeom prst="rect">
+              <a:avLst/>
+            </a:prstGeom>
+            <a:noFill/>
+          </p:spPr>
+          <p:txBody>
+            <a:bodyPr wrap="none" rtlCol="0">
+              <a:spAutoFit/>
+            </a:bodyPr>
+            <a:lstStyle/>
+            <a:p>
+              <a:r>
+                <a:rPr lang="es-ES" sz="3600" dirty="0">
+                  <a:solidFill>
+                    <a:schemeClr val="bg1"/>
+                  </a:solidFill>
+                </a:rPr>
+                <a:t>Rodolfo</a:t>
+              </a:r>
+              <a:endParaRPr lang="es-MX" sz="3600" dirty="0">
+                <a:solidFill>
+                  <a:schemeClr val="bg1"/>
+                </a:solidFill>
+              </a:endParaRPr>
+            </a:p>
+          </p:txBody>
+        </p:sp>
+      </p:grpSp>
+      <p:sp>
+        <p:nvSpPr>
+          <p:cNvPr id="74" name="TextBox 73">
+            <a:extLst>
+              <a:ext uri="{FF2B5EF4-FFF2-40B4-BE49-F238E27FC236}">
+                <a16:creationId xmlns:a16="http://schemas.microsoft.com/office/drawing/2014/main" id="{5AF59841-ACE6-4F36-9A7A-8CF6D9B325C3}"/>
+              </a:ext>
+            </a:extLst>
+          </p:cNvPr>
+          <p:cNvSpPr txBox="1"/>
+          <p:nvPr/>
+        </p:nvSpPr>
+        <p:spPr>
+          <a:xfrm>
+            <a:off x="-7410432" y="9768067"/>
+            <a:ext cx="4735592" cy="3108543"/>
+          </a:xfrm>
+          <a:prstGeom prst="rect">
+            <a:avLst/>
+          </a:prstGeom>
+          <a:noFill/>
+        </p:spPr>
+        <p:txBody>
+          <a:bodyPr wrap="none" rtlCol="0">
+            <a:spAutoFit/>
+          </a:bodyPr>
+          <a:lstStyle/>
+          <a:p>
+            <a:r>
+              <a:rPr lang="en-US" sz="2800" b="1" dirty="0">
+                <a:solidFill>
+                  <a:schemeClr val="bg1"/>
+                </a:solidFill>
+                <a:latin typeface="Bahnschrift" panose="020B0502040204020203" pitchFamily="34" charset="0"/>
+              </a:rPr>
+              <a:t>Display name: </a:t>
+            </a:r>
+            <a:r>
+              <a:rPr lang="en-US" sz="2800" dirty="0">
+                <a:solidFill>
+                  <a:schemeClr val="bg1"/>
+                </a:solidFill>
+                <a:latin typeface="Bahnschrift" panose="020B0502040204020203" pitchFamily="34" charset="0"/>
+              </a:rPr>
+              <a:t>Julián</a:t>
+            </a:r>
+          </a:p>
+          <a:p>
+            <a:r>
+              <a:rPr lang="en-US" sz="2800" b="1" dirty="0">
+                <a:solidFill>
+                  <a:schemeClr val="bg1"/>
+                </a:solidFill>
+                <a:latin typeface="Bahnschrift" panose="020B0502040204020203" pitchFamily="34" charset="0"/>
+              </a:rPr>
+              <a:t>Username:</a:t>
+            </a:r>
+            <a:r>
+              <a:rPr lang="en-US" sz="2800" dirty="0">
+                <a:solidFill>
+                  <a:schemeClr val="bg1"/>
+                </a:solidFill>
+                <a:latin typeface="Bahnschrift" panose="020B0502040204020203" pitchFamily="34" charset="0"/>
+              </a:rPr>
+              <a:t> julian1234</a:t>
+            </a:r>
+          </a:p>
+          <a:p>
+            <a:r>
+              <a:rPr lang="en-US" sz="2800" b="1" dirty="0">
+                <a:solidFill>
+                  <a:schemeClr val="bg1"/>
+                </a:solidFill>
+                <a:latin typeface="Bahnschrift" panose="020B0502040204020203" pitchFamily="34" charset="0"/>
+              </a:rPr>
+              <a:t>Friend code:</a:t>
+            </a:r>
+            <a:r>
+              <a:rPr lang="en-US" sz="2800" dirty="0">
+                <a:solidFill>
+                  <a:schemeClr val="bg1"/>
+                </a:solidFill>
+                <a:latin typeface="Bahnschrift" panose="020B0502040204020203" pitchFamily="34" charset="0"/>
+              </a:rPr>
+              <a:t> 12445</a:t>
+            </a:r>
+          </a:p>
+          <a:p>
+            <a:r>
+              <a:rPr lang="en-US" sz="2800" b="1" dirty="0">
+                <a:solidFill>
+                  <a:schemeClr val="bg1"/>
+                </a:solidFill>
+                <a:latin typeface="Bahnschrift" panose="020B0502040204020203" pitchFamily="34" charset="0"/>
+              </a:rPr>
+              <a:t>Friend since: </a:t>
+            </a:r>
+            <a:r>
+              <a:rPr lang="en-US" sz="2800" dirty="0">
+                <a:solidFill>
+                  <a:schemeClr val="bg1"/>
+                </a:solidFill>
+                <a:latin typeface="Bahnschrift" panose="020B0502040204020203" pitchFamily="34" charset="0"/>
+              </a:rPr>
+              <a:t>02/oct/2018</a:t>
+            </a:r>
+          </a:p>
+          <a:p>
+            <a:r>
+              <a:rPr lang="en-US" sz="2800" b="1" dirty="0">
+                <a:solidFill>
+                  <a:schemeClr val="bg1"/>
+                </a:solidFill>
+                <a:latin typeface="Bahnschrift" panose="020B0502040204020203" pitchFamily="34" charset="0"/>
+              </a:rPr>
+              <a:t>Challenges won: </a:t>
+            </a:r>
+            <a:r>
+              <a:rPr lang="en-US" sz="2800" dirty="0">
+                <a:solidFill>
+                  <a:schemeClr val="bg1"/>
+                </a:solidFill>
+                <a:latin typeface="Bahnschrift" panose="020B0502040204020203" pitchFamily="34" charset="0"/>
+              </a:rPr>
+              <a:t>23 ($ 12,000)</a:t>
+            </a:r>
+          </a:p>
+          <a:p>
+            <a:r>
+              <a:rPr lang="en-US" sz="2800" b="1" dirty="0">
+                <a:solidFill>
+                  <a:schemeClr val="bg1"/>
+                </a:solidFill>
+                <a:latin typeface="Bahnschrift" panose="020B0502040204020203" pitchFamily="34" charset="0"/>
+              </a:rPr>
+              <a:t>Challenges lose: </a:t>
+            </a:r>
+            <a:r>
+              <a:rPr lang="en-US" sz="2800" dirty="0">
+                <a:solidFill>
+                  <a:schemeClr val="bg1"/>
+                </a:solidFill>
+                <a:latin typeface="Bahnschrift" panose="020B0502040204020203" pitchFamily="34" charset="0"/>
+              </a:rPr>
+              <a:t>1 ($ 1300)</a:t>
+            </a:r>
+          </a:p>
+          <a:p>
+            <a:endParaRPr lang="en-US" sz="2800" b="1" dirty="0">
+              <a:solidFill>
+                <a:schemeClr val="bg1"/>
+              </a:solidFill>
+              <a:latin typeface="Bahnschrift" panose="020B0502040204020203" pitchFamily="34" charset="0"/>
+            </a:endParaRPr>
+          </a:p>
+        </p:txBody>
+      </p:sp>
+      <p:pic>
+        <p:nvPicPr>
+          <p:cNvPr id="75" name="Picture 74">
+            <a:extLst>
+              <a:ext uri="{FF2B5EF4-FFF2-40B4-BE49-F238E27FC236}">
+                <a16:creationId xmlns:a16="http://schemas.microsoft.com/office/drawing/2014/main" id="{22C90DEC-9B9E-44F4-B721-15779A710309}"/>
+              </a:ext>
+            </a:extLst>
+          </p:cNvPr>
+          <p:cNvPicPr>
+            <a:picLocks noChangeAspect="1"/>
+          </p:cNvPicPr>
+          <p:nvPr/>
+        </p:nvPicPr>
+        <p:blipFill>
+          <a:blip r:embed="rId5">
+            <a:extLst>
+              <a:ext uri="{28A0092B-C50C-407E-A947-70E740481C1C}">
+                <a14:useLocalDpi xmlns:a14="http://schemas.microsoft.com/office/drawing/2010/main" val="0"/>
+              </a:ext>
+            </a:extLst>
+          </a:blip>
+          <a:stretch>
+            <a:fillRect/>
+          </a:stretch>
+        </p:blipFill>
+        <p:spPr>
+          <a:xfrm>
+            <a:off x="-7419326" y="13746010"/>
+            <a:ext cx="587250" cy="559518"/>
+          </a:xfrm>
+          <a:prstGeom prst="ellipse">
+            <a:avLst/>
+          </a:prstGeom>
+          <a:ln w="63500" cap="rnd">
+            <a:noFill/>
+          </a:ln>
+          <a:effectLst>
+            <a:outerShdw blurRad="149987" dist="250190" dir="8460000" algn="ctr">
+              <a:srgbClr val="000000">
+                <a:alpha val="28000"/>
+              </a:srgbClr>
+            </a:outerShdw>
+          </a:effectLst>
+          <a:scene3d>
+            <a:camera prst="orthographicFront">
+              <a:rot lat="0" lon="0" rev="0"/>
+            </a:camera>
+            <a:lightRig rig="contrasting" dir="t">
+              <a:rot lat="0" lon="0" rev="1500000"/>
+            </a:lightRig>
+          </a:scene3d>
+          <a:sp3d prstMaterial="metal">
+            <a:bevelT w="88900" h="88900"/>
+          </a:sp3d>
+        </p:spPr>
+      </p:pic>
+      <p:sp>
+        <p:nvSpPr>
+          <p:cNvPr id="63" name="Rectangle: Rounded Corners 62">
+            <a:extLst>
+              <a:ext uri="{FF2B5EF4-FFF2-40B4-BE49-F238E27FC236}">
+                <a16:creationId xmlns:a16="http://schemas.microsoft.com/office/drawing/2014/main" id="{00DF8CEC-6C34-418C-BC41-CAD33226B509}"/>
+              </a:ext>
+            </a:extLst>
+          </p:cNvPr>
+          <p:cNvSpPr/>
+          <p:nvPr/>
+        </p:nvSpPr>
+        <p:spPr>
+          <a:xfrm>
+            <a:off x="-5713962" y="12518547"/>
+            <a:ext cx="1827889" cy="625935"/>
+          </a:xfrm>
+          <a:prstGeom prst="roundRect">
+            <a:avLst/>
+          </a:prstGeom>
+          <a:solidFill>
+            <a:srgbClr val="C00000"/>
+          </a:solidFill>
+          <a:ln>
+            <a:noFill/>
+          </a:ln>
+        </p:spPr>
+        <p:style>
+          <a:lnRef idx="2">
+            <a:schemeClr val="accent1">
+              <a:shade val="50000"/>
+            </a:schemeClr>
+          </a:lnRef>
+          <a:fillRef idx="1">
+            <a:schemeClr val="accent1"/>
+          </a:fillRef>
+          <a:effectRef idx="0">
+            <a:schemeClr val="accent1"/>
+          </a:effectRef>
+          <a:fontRef idx="minor">
+            <a:schemeClr val="lt1"/>
+          </a:fontRef>
+        </p:style>
+        <p:txBody>
+          <a:bodyPr rtlCol="0" anchor="ctr"/>
+          <a:lstStyle/>
+          <a:p>
+            <a:pPr algn="ctr"/>
+            <a:r>
+              <a:rPr lang="en-US" dirty="0"/>
+              <a:t>Delete</a:t>
+            </a:r>
+          </a:p>
+        </p:txBody>
+      </p:sp>
     </p:spTree>
     <p:extLst>
       <p:ext uri="{BB962C8B-B14F-4D97-AF65-F5344CB8AC3E}">

</xml_diff>